<commit_message>
updated slide decks a little; small changes elsewhere
</commit_message>
<xml_diff>
--- a/static/powerpoint/SlideDeck1.pptx
+++ b/static/powerpoint/SlideDeck1.pptx
@@ -146,22 +146,45 @@
   <pc:docChgLst>
     <pc:chgData name="Bart Naudts" userId="1439a2f6791640ec" providerId="LiveId" clId="{CAF2192B-6F1F-294E-AB18-06BD1A5CD87B}"/>
     <pc:docChg chg="undo custSel modSld sldOrd">
-      <pc:chgData name="Bart Naudts" userId="1439a2f6791640ec" providerId="LiveId" clId="{CAF2192B-6F1F-294E-AB18-06BD1A5CD87B}" dt="2021-03-24T15:46:07.439" v="2125" actId="20577"/>
+      <pc:chgData name="Bart Naudts" userId="1439a2f6791640ec" providerId="LiveId" clId="{CAF2192B-6F1F-294E-AB18-06BD1A5CD87B}" dt="2021-04-26T06:15:49.554" v="2151" actId="20577"/>
       <pc:docMkLst>
         <pc:docMk/>
       </pc:docMkLst>
       <pc:sldChg chg="modSp mod">
-        <pc:chgData name="Bart Naudts" userId="1439a2f6791640ec" providerId="LiveId" clId="{CAF2192B-6F1F-294E-AB18-06BD1A5CD87B}" dt="2021-03-24T15:46:07.439" v="2125" actId="20577"/>
+        <pc:chgData name="Bart Naudts" userId="1439a2f6791640ec" providerId="LiveId" clId="{CAF2192B-6F1F-294E-AB18-06BD1A5CD87B}" dt="2021-04-26T06:14:29.107" v="2146" actId="114"/>
         <pc:sldMkLst>
           <pc:docMk/>
           <pc:sldMk cId="2938719510" sldId="256"/>
         </pc:sldMkLst>
+        <pc:spChg chg="mod">
+          <ac:chgData name="Bart Naudts" userId="1439a2f6791640ec" providerId="LiveId" clId="{CAF2192B-6F1F-294E-AB18-06BD1A5CD87B}" dt="2021-04-26T06:14:29.107" v="2146" actId="114"/>
+          <ac:spMkLst>
+            <pc:docMk/>
+            <pc:sldMk cId="2938719510" sldId="256"/>
+            <ac:spMk id="2" creationId="{8400D348-059E-B648-B39D-3C8BD492DABA}"/>
+          </ac:spMkLst>
+        </pc:spChg>
         <pc:spChg chg="mod">
           <ac:chgData name="Bart Naudts" userId="1439a2f6791640ec" providerId="LiveId" clId="{CAF2192B-6F1F-294E-AB18-06BD1A5CD87B}" dt="2021-03-24T15:46:07.439" v="2125" actId="20577"/>
           <ac:spMkLst>
             <pc:docMk/>
             <pc:sldMk cId="2938719510" sldId="256"/>
             <ac:spMk id="3" creationId="{72428F1F-AD2A-A146-AC14-DFAE47526FDC}"/>
+          </ac:spMkLst>
+        </pc:spChg>
+      </pc:sldChg>
+      <pc:sldChg chg="modSp mod">
+        <pc:chgData name="Bart Naudts" userId="1439a2f6791640ec" providerId="LiveId" clId="{CAF2192B-6F1F-294E-AB18-06BD1A5CD87B}" dt="2021-04-26T06:14:17.153" v="2139" actId="114"/>
+        <pc:sldMkLst>
+          <pc:docMk/>
+          <pc:sldMk cId="1851960347" sldId="257"/>
+        </pc:sldMkLst>
+        <pc:spChg chg="mod">
+          <ac:chgData name="Bart Naudts" userId="1439a2f6791640ec" providerId="LiveId" clId="{CAF2192B-6F1F-294E-AB18-06BD1A5CD87B}" dt="2021-04-26T06:14:17.153" v="2139" actId="114"/>
+          <ac:spMkLst>
+            <pc:docMk/>
+            <pc:sldMk cId="1851960347" sldId="257"/>
+            <ac:spMk id="2" creationId="{A6756F90-B85A-5741-A818-A6B558AE7A0A}"/>
           </ac:spMkLst>
         </pc:spChg>
       </pc:sldChg>
@@ -196,13 +219,13 @@
         </pc:spChg>
       </pc:sldChg>
       <pc:sldChg chg="modSp mod">
-        <pc:chgData name="Bart Naudts" userId="1439a2f6791640ec" providerId="LiveId" clId="{CAF2192B-6F1F-294E-AB18-06BD1A5CD87B}" dt="2021-03-15T21:02:33.753" v="74" actId="21"/>
+        <pc:chgData name="Bart Naudts" userId="1439a2f6791640ec" providerId="LiveId" clId="{CAF2192B-6F1F-294E-AB18-06BD1A5CD87B}" dt="2021-04-26T06:14:00.072" v="2132" actId="114"/>
         <pc:sldMkLst>
           <pc:docMk/>
           <pc:sldMk cId="2026024247" sldId="261"/>
         </pc:sldMkLst>
         <pc:spChg chg="mod">
-          <ac:chgData name="Bart Naudts" userId="1439a2f6791640ec" providerId="LiveId" clId="{CAF2192B-6F1F-294E-AB18-06BD1A5CD87B}" dt="2021-03-15T21:01:38.867" v="71" actId="20577"/>
+          <ac:chgData name="Bart Naudts" userId="1439a2f6791640ec" providerId="LiveId" clId="{CAF2192B-6F1F-294E-AB18-06BD1A5CD87B}" dt="2021-04-26T06:14:00.072" v="2132" actId="114"/>
           <ac:spMkLst>
             <pc:docMk/>
             <pc:sldMk cId="2026024247" sldId="261"/>
@@ -295,13 +318,13 @@
         </pc:spChg>
       </pc:sldChg>
       <pc:sldChg chg="modSp mod">
-        <pc:chgData name="Bart Naudts" userId="1439a2f6791640ec" providerId="LiveId" clId="{CAF2192B-6F1F-294E-AB18-06BD1A5CD87B}" dt="2021-03-15T21:08:39.769" v="311" actId="20577"/>
+        <pc:chgData name="Bart Naudts" userId="1439a2f6791640ec" providerId="LiveId" clId="{CAF2192B-6F1F-294E-AB18-06BD1A5CD87B}" dt="2021-04-26T06:15:49.554" v="2151" actId="20577"/>
         <pc:sldMkLst>
           <pc:docMk/>
           <pc:sldMk cId="2219509717" sldId="266"/>
         </pc:sldMkLst>
         <pc:spChg chg="mod">
-          <ac:chgData name="Bart Naudts" userId="1439a2f6791640ec" providerId="LiveId" clId="{CAF2192B-6F1F-294E-AB18-06BD1A5CD87B}" dt="2021-03-15T21:08:39.769" v="311" actId="20577"/>
+          <ac:chgData name="Bart Naudts" userId="1439a2f6791640ec" providerId="LiveId" clId="{CAF2192B-6F1F-294E-AB18-06BD1A5CD87B}" dt="2021-04-26T06:15:49.554" v="2151" actId="20577"/>
           <ac:spMkLst>
             <pc:docMk/>
             <pc:sldMk cId="2219509717" sldId="266"/>
@@ -621,7 +644,7 @@
           <a:p>
             <a:fld id="{139140B8-3B78-2149-9DFE-CC3FBE7760E8}" type="datetimeFigureOut">
               <a:rPr lang="en-BE" smtClean="0"/>
-              <a:t>24/03/2021</a:t>
+              <a:t>26/04/2021</a:t>
             </a:fld>
             <a:endParaRPr lang="en-BE"/>
           </a:p>
@@ -821,7 +844,7 @@
           <a:p>
             <a:fld id="{139140B8-3B78-2149-9DFE-CC3FBE7760E8}" type="datetimeFigureOut">
               <a:rPr lang="en-BE" smtClean="0"/>
-              <a:t>24/03/2021</a:t>
+              <a:t>26/04/2021</a:t>
             </a:fld>
             <a:endParaRPr lang="en-BE"/>
           </a:p>
@@ -1031,7 +1054,7 @@
           <a:p>
             <a:fld id="{139140B8-3B78-2149-9DFE-CC3FBE7760E8}" type="datetimeFigureOut">
               <a:rPr lang="en-BE" smtClean="0"/>
-              <a:t>24/03/2021</a:t>
+              <a:t>26/04/2021</a:t>
             </a:fld>
             <a:endParaRPr lang="en-BE"/>
           </a:p>
@@ -1231,7 +1254,7 @@
           <a:p>
             <a:fld id="{139140B8-3B78-2149-9DFE-CC3FBE7760E8}" type="datetimeFigureOut">
               <a:rPr lang="en-BE" smtClean="0"/>
-              <a:t>24/03/2021</a:t>
+              <a:t>26/04/2021</a:t>
             </a:fld>
             <a:endParaRPr lang="en-BE"/>
           </a:p>
@@ -1507,7 +1530,7 @@
           <a:p>
             <a:fld id="{139140B8-3B78-2149-9DFE-CC3FBE7760E8}" type="datetimeFigureOut">
               <a:rPr lang="en-BE" smtClean="0"/>
-              <a:t>24/03/2021</a:t>
+              <a:t>26/04/2021</a:t>
             </a:fld>
             <a:endParaRPr lang="en-BE"/>
           </a:p>
@@ -1775,7 +1798,7 @@
           <a:p>
             <a:fld id="{139140B8-3B78-2149-9DFE-CC3FBE7760E8}" type="datetimeFigureOut">
               <a:rPr lang="en-BE" smtClean="0"/>
-              <a:t>24/03/2021</a:t>
+              <a:t>26/04/2021</a:t>
             </a:fld>
             <a:endParaRPr lang="en-BE"/>
           </a:p>
@@ -2190,7 +2213,7 @@
           <a:p>
             <a:fld id="{139140B8-3B78-2149-9DFE-CC3FBE7760E8}" type="datetimeFigureOut">
               <a:rPr lang="en-BE" smtClean="0"/>
-              <a:t>24/03/2021</a:t>
+              <a:t>26/04/2021</a:t>
             </a:fld>
             <a:endParaRPr lang="en-BE"/>
           </a:p>
@@ -2332,7 +2355,7 @@
           <a:p>
             <a:fld id="{139140B8-3B78-2149-9DFE-CC3FBE7760E8}" type="datetimeFigureOut">
               <a:rPr lang="en-BE" smtClean="0"/>
-              <a:t>24/03/2021</a:t>
+              <a:t>26/04/2021</a:t>
             </a:fld>
             <a:endParaRPr lang="en-BE"/>
           </a:p>
@@ -2445,7 +2468,7 @@
           <a:p>
             <a:fld id="{139140B8-3B78-2149-9DFE-CC3FBE7760E8}" type="datetimeFigureOut">
               <a:rPr lang="en-BE" smtClean="0"/>
-              <a:t>24/03/2021</a:t>
+              <a:t>26/04/2021</a:t>
             </a:fld>
             <a:endParaRPr lang="en-BE"/>
           </a:p>
@@ -2758,7 +2781,7 @@
           <a:p>
             <a:fld id="{139140B8-3B78-2149-9DFE-CC3FBE7760E8}" type="datetimeFigureOut">
               <a:rPr lang="en-BE" smtClean="0"/>
-              <a:t>24/03/2021</a:t>
+              <a:t>26/04/2021</a:t>
             </a:fld>
             <a:endParaRPr lang="en-BE"/>
           </a:p>
@@ -3047,7 +3070,7 @@
           <a:p>
             <a:fld id="{139140B8-3B78-2149-9DFE-CC3FBE7760E8}" type="datetimeFigureOut">
               <a:rPr lang="en-BE" smtClean="0"/>
-              <a:t>24/03/2021</a:t>
+              <a:t>26/04/2021</a:t>
             </a:fld>
             <a:endParaRPr lang="en-BE"/>
           </a:p>
@@ -3290,7 +3313,7 @@
           <a:p>
             <a:fld id="{139140B8-3B78-2149-9DFE-CC3FBE7760E8}" type="datetimeFigureOut">
               <a:rPr lang="en-BE" smtClean="0"/>
-              <a:t>24/03/2021</a:t>
+              <a:t>26/04/2021</a:t>
             </a:fld>
             <a:endParaRPr lang="en-BE"/>
           </a:p>
@@ -3731,8 +3754,8 @@
           <a:lstStyle/>
           <a:p>
             <a:r>
-              <a:rPr lang="en-BE" dirty="0"/>
-              <a:t>E2IMMU</a:t>
+              <a:rPr lang="en-BE" i="1" dirty="0"/>
+              <a:t>e2immu</a:t>
             </a:r>
             <a:br>
               <a:rPr lang="en-BE" dirty="0"/>
@@ -3911,7 +3934,7 @@
           <a:p>
             <a:r>
               <a:rPr lang="en-BE" dirty="0"/>
-              <a:t>The majority of classes in your project should be containers</a:t>
+              <a:t>The majority of types in your project should be containers</a:t>
             </a:r>
           </a:p>
         </p:txBody>
@@ -5174,7 +5197,15 @@
           <a:p>
             <a:r>
               <a:rPr lang="en-BE" dirty="0"/>
-              <a:t>What is E2IMMU?</a:t>
+              <a:t>What is </a:t>
+            </a:r>
+            <a:r>
+              <a:rPr lang="en-BE" i="1" dirty="0"/>
+              <a:t>e2immu</a:t>
+            </a:r>
+            <a:r>
+              <a:rPr lang="en-BE" dirty="0"/>
+              <a:t>?</a:t>
             </a:r>
           </a:p>
         </p:txBody>
@@ -6232,7 +6263,15 @@
           <a:p>
             <a:r>
               <a:rPr lang="en-BE" dirty="0"/>
-              <a:t>Does E2IMMU do typical analyser stuff?</a:t>
+              <a:t>Does </a:t>
+            </a:r>
+            <a:r>
+              <a:rPr lang="en-BE" i="1" dirty="0"/>
+              <a:t>e2immu</a:t>
+            </a:r>
+            <a:r>
+              <a:rPr lang="en-BE" dirty="0"/>
+              <a:t> do typical analyser stuff?</a:t>
             </a:r>
           </a:p>
         </p:txBody>

</xml_diff>

<commit_message>
updated road-to-immutability, slide decks, and intro
</commit_message>
<xml_diff>
--- a/static/powerpoint/SlideDeck1.pptx
+++ b/static/powerpoint/SlideDeck1.pptx
@@ -644,7 +644,7 @@
           <a:p>
             <a:fld id="{139140B8-3B78-2149-9DFE-CC3FBE7760E8}" type="datetimeFigureOut">
               <a:rPr lang="en-BE" smtClean="0"/>
-              <a:t>26/04/2021</a:t>
+              <a:t>10/24/23</a:t>
             </a:fld>
             <a:endParaRPr lang="en-BE"/>
           </a:p>
@@ -844,7 +844,7 @@
           <a:p>
             <a:fld id="{139140B8-3B78-2149-9DFE-CC3FBE7760E8}" type="datetimeFigureOut">
               <a:rPr lang="en-BE" smtClean="0"/>
-              <a:t>26/04/2021</a:t>
+              <a:t>10/24/23</a:t>
             </a:fld>
             <a:endParaRPr lang="en-BE"/>
           </a:p>
@@ -1054,7 +1054,7 @@
           <a:p>
             <a:fld id="{139140B8-3B78-2149-9DFE-CC3FBE7760E8}" type="datetimeFigureOut">
               <a:rPr lang="en-BE" smtClean="0"/>
-              <a:t>26/04/2021</a:t>
+              <a:t>10/24/23</a:t>
             </a:fld>
             <a:endParaRPr lang="en-BE"/>
           </a:p>
@@ -1254,7 +1254,7 @@
           <a:p>
             <a:fld id="{139140B8-3B78-2149-9DFE-CC3FBE7760E8}" type="datetimeFigureOut">
               <a:rPr lang="en-BE" smtClean="0"/>
-              <a:t>26/04/2021</a:t>
+              <a:t>10/24/23</a:t>
             </a:fld>
             <a:endParaRPr lang="en-BE"/>
           </a:p>
@@ -1530,7 +1530,7 @@
           <a:p>
             <a:fld id="{139140B8-3B78-2149-9DFE-CC3FBE7760E8}" type="datetimeFigureOut">
               <a:rPr lang="en-BE" smtClean="0"/>
-              <a:t>26/04/2021</a:t>
+              <a:t>10/24/23</a:t>
             </a:fld>
             <a:endParaRPr lang="en-BE"/>
           </a:p>
@@ -1798,7 +1798,7 @@
           <a:p>
             <a:fld id="{139140B8-3B78-2149-9DFE-CC3FBE7760E8}" type="datetimeFigureOut">
               <a:rPr lang="en-BE" smtClean="0"/>
-              <a:t>26/04/2021</a:t>
+              <a:t>10/24/23</a:t>
             </a:fld>
             <a:endParaRPr lang="en-BE"/>
           </a:p>
@@ -2213,7 +2213,7 @@
           <a:p>
             <a:fld id="{139140B8-3B78-2149-9DFE-CC3FBE7760E8}" type="datetimeFigureOut">
               <a:rPr lang="en-BE" smtClean="0"/>
-              <a:t>26/04/2021</a:t>
+              <a:t>10/24/23</a:t>
             </a:fld>
             <a:endParaRPr lang="en-BE"/>
           </a:p>
@@ -2355,7 +2355,7 @@
           <a:p>
             <a:fld id="{139140B8-3B78-2149-9DFE-CC3FBE7760E8}" type="datetimeFigureOut">
               <a:rPr lang="en-BE" smtClean="0"/>
-              <a:t>26/04/2021</a:t>
+              <a:t>10/24/23</a:t>
             </a:fld>
             <a:endParaRPr lang="en-BE"/>
           </a:p>
@@ -2468,7 +2468,7 @@
           <a:p>
             <a:fld id="{139140B8-3B78-2149-9DFE-CC3FBE7760E8}" type="datetimeFigureOut">
               <a:rPr lang="en-BE" smtClean="0"/>
-              <a:t>26/04/2021</a:t>
+              <a:t>10/24/23</a:t>
             </a:fld>
             <a:endParaRPr lang="en-BE"/>
           </a:p>
@@ -2781,7 +2781,7 @@
           <a:p>
             <a:fld id="{139140B8-3B78-2149-9DFE-CC3FBE7760E8}" type="datetimeFigureOut">
               <a:rPr lang="en-BE" smtClean="0"/>
-              <a:t>26/04/2021</a:t>
+              <a:t>10/24/23</a:t>
             </a:fld>
             <a:endParaRPr lang="en-BE"/>
           </a:p>
@@ -3070,7 +3070,7 @@
           <a:p>
             <a:fld id="{139140B8-3B78-2149-9DFE-CC3FBE7760E8}" type="datetimeFigureOut">
               <a:rPr lang="en-BE" smtClean="0"/>
-              <a:t>26/04/2021</a:t>
+              <a:t>10/24/23</a:t>
             </a:fld>
             <a:endParaRPr lang="en-BE"/>
           </a:p>
@@ -3313,7 +3313,7 @@
           <a:p>
             <a:fld id="{139140B8-3B78-2149-9DFE-CC3FBE7760E8}" type="datetimeFigureOut">
               <a:rPr lang="en-BE" smtClean="0"/>
-              <a:t>26/04/2021</a:t>
+              <a:t>10/24/23</a:t>
             </a:fld>
             <a:endParaRPr lang="en-BE"/>
           </a:p>
@@ -3794,7 +3794,9 @@
           </a:xfrm>
         </p:spPr>
         <p:txBody>
-          <a:bodyPr/>
+          <a:bodyPr>
+            <a:normAutofit lnSpcReduction="10000"/>
+          </a:bodyPr>
           <a:lstStyle/>
           <a:p>
             <a:r>
@@ -3814,9 +3816,17 @@
           </a:p>
           <a:p>
             <a:r>
-              <a:rPr lang="en-BE" dirty="0"/>
+              <a:rPr lang="en-BE"/>
               <a:t>Bart Naudts</a:t>
             </a:r>
+            <a:endParaRPr lang="en-US" dirty="0"/>
+          </a:p>
+          <a:p>
+            <a:r>
+              <a:rPr lang="en-US" dirty="0"/>
+              <a:t>Updated October 2023</a:t>
+            </a:r>
+            <a:endParaRPr lang="en-BE" dirty="0"/>
           </a:p>
         </p:txBody>
       </p:sp>
@@ -3916,13 +3926,30 @@
             </a:r>
             <a:r>
               <a:rPr lang="en-BE" dirty="0"/>
-              <a:t>: no non-private method in a type should modify its parameters</a:t>
-            </a:r>
-          </a:p>
-          <a:p>
-            <a:r>
-              <a:rPr lang="en-BE" dirty="0"/>
-              <a:t>We call such a type a container, because you can safely hand an object to a container: it may store it, pass it on, inspect it, but it will never modify it</a:t>
+              <a:t>: no non-private method in a type should </a:t>
+            </a:r>
+            <a:r>
+              <a:rPr lang="en-BE"/>
+              <a:t>modify </a:t>
+            </a:r>
+            <a:r>
+              <a:rPr lang="en-US" dirty="0"/>
+              <a:t>the arguments it has been given</a:t>
+            </a:r>
+            <a:endParaRPr lang="en-BE" dirty="0"/>
+          </a:p>
+          <a:p>
+            <a:r>
+              <a:rPr lang="en-US" dirty="0"/>
+              <a:t>Y</a:t>
+            </a:r>
+            <a:r>
+              <a:rPr lang="en-BE"/>
+              <a:t>ou </a:t>
+            </a:r>
+            <a:r>
+              <a:rPr lang="en-BE" dirty="0"/>
+              <a:t>can safely hand an object to a container: it may store it, pass it on, inspect it, but it will never modify it</a:t>
             </a:r>
           </a:p>
           <a:p>
@@ -4002,9 +4029,14 @@
           <a:lstStyle/>
           <a:p>
             <a:r>
-              <a:rPr lang="en-BE" dirty="0"/>
-              <a:t>@E1Immutable</a:t>
-            </a:r>
+              <a:rPr lang="en-BE"/>
+              <a:t>@</a:t>
+            </a:r>
+            <a:r>
+              <a:rPr lang="en-US" dirty="0"/>
+              <a:t>FinalFields</a:t>
+            </a:r>
+            <a:endParaRPr lang="en-BE" dirty="0"/>
           </a:p>
         </p:txBody>
       </p:sp>
@@ -4068,8 +4100,17 @@
           <a:p>
             <a:r>
               <a:rPr lang="en-BE" dirty="0"/>
-              <a:t>Java records are @E1Immutable</a:t>
-            </a:r>
+              <a:t>Java records </a:t>
+            </a:r>
+            <a:r>
+              <a:rPr lang="en-BE"/>
+              <a:t>are @</a:t>
+            </a:r>
+            <a:r>
+              <a:rPr lang="en-US" dirty="0"/>
+              <a:t>FinalFields</a:t>
+            </a:r>
+            <a:endParaRPr lang="en-BE" dirty="0"/>
           </a:p>
           <a:p>
             <a:r>
@@ -4084,7 +4125,23 @@
           <a:p>
             <a:r>
               <a:rPr lang="en-BE" dirty="0"/>
-              <a:t>Builders typically are not @E1Immutable, but they help construct immutable types</a:t>
+              <a:t>Builders typically are </a:t>
+            </a:r>
+            <a:r>
+              <a:rPr lang="en-BE"/>
+              <a:t>not @</a:t>
+            </a:r>
+            <a:r>
+              <a:rPr lang="en-US" dirty="0"/>
+              <a:t>FinalFields</a:t>
+            </a:r>
+            <a:r>
+              <a:rPr lang="en-BE"/>
+              <a:t>, </a:t>
+            </a:r>
+            <a:r>
+              <a:rPr lang="en-BE" dirty="0"/>
+              <a:t>but they help construct immutable types</a:t>
             </a:r>
           </a:p>
           <a:p>
@@ -4094,8 +4151,17 @@
             </a:r>
             <a:r>
               <a:rPr lang="en-BE" dirty="0"/>
-              <a:t>: most non-builder types should be @E1Immutable</a:t>
-            </a:r>
+              <a:t>: most non-builder types should </a:t>
+            </a:r>
+            <a:r>
+              <a:rPr lang="en-BE"/>
+              <a:t>be @</a:t>
+            </a:r>
+            <a:r>
+              <a:rPr lang="en-US" dirty="0"/>
+              <a:t>FinalFields</a:t>
+            </a:r>
+            <a:endParaRPr lang="en-BE" dirty="0"/>
           </a:p>
         </p:txBody>
       </p:sp>
@@ -4324,7 +4390,15 @@
           <a:p>
             <a:r>
               <a:rPr lang="en-BE" dirty="0"/>
-              <a:t>Instead, @E2Immutable can be described by:</a:t>
+              <a:t>Instead</a:t>
+            </a:r>
+            <a:r>
+              <a:rPr lang="en-BE"/>
+              <a:t>, @Immutable </a:t>
+            </a:r>
+            <a:r>
+              <a:rPr lang="en-BE" dirty="0"/>
+              <a:t>can be described by:</a:t>
             </a:r>
           </a:p>
           <a:p>
@@ -4415,8 +4489,12 @@
           <a:lstStyle/>
           <a:p>
             <a:r>
-              <a:rPr lang="en-BE" dirty="0"/>
-              <a:t>@E2Immutable (part 1)</a:t>
+              <a:rPr lang="en-BE"/>
+              <a:t>@Immutable </a:t>
+            </a:r>
+            <a:r>
+              <a:rPr lang="en-BE" dirty="0"/>
+              <a:t>(part 1)</a:t>
             </a:r>
           </a:p>
         </p:txBody>
@@ -4458,7 +4536,15 @@
             </a:pPr>
             <a:r>
               <a:rPr lang="en-BE" dirty="0"/>
-              <a:t>RULE 2: all fields should be private or of @E2Immutable type</a:t>
+              <a:t>RULE 2: all fields should be private or </a:t>
+            </a:r>
+            <a:r>
+              <a:rPr lang="en-BE"/>
+              <a:t>of @Immutable </a:t>
+            </a:r>
+            <a:r>
+              <a:rPr lang="en-BE" dirty="0"/>
+              <a:t>type</a:t>
             </a:r>
           </a:p>
           <a:p>
@@ -4483,8 +4569,17 @@
             </a:r>
             <a:r>
               <a:rPr lang="en-BE" dirty="0"/>
-              <a:t> implies that the type is @E1Immutable</a:t>
-            </a:r>
+              <a:t> implies that the type </a:t>
+            </a:r>
+            <a:r>
+              <a:rPr lang="en-BE"/>
+              <a:t>is @</a:t>
+            </a:r>
+            <a:r>
+              <a:rPr lang="en-US" dirty="0"/>
+              <a:t>FinalFields</a:t>
+            </a:r>
+            <a:endParaRPr lang="en-BE" dirty="0"/>
           </a:p>
           <a:p>
             <a:r>
@@ -4564,7 +4659,15 @@
           <a:p>
             <a:r>
               <a:rPr lang="en-BE" dirty="0"/>
-              <a:t>Examples of @E2Immutable types</a:t>
+              <a:t>Examples </a:t>
+            </a:r>
+            <a:r>
+              <a:rPr lang="en-BE"/>
+              <a:t>of @Immutable </a:t>
+            </a:r>
+            <a:r>
+              <a:rPr lang="en-BE" dirty="0"/>
+              <a:t>types</a:t>
             </a:r>
           </a:p>
         </p:txBody>
@@ -4594,31 +4697,66 @@
           <a:p>
             <a:r>
               <a:rPr lang="en-BE" dirty="0"/>
-              <a:t>Primitives and deeply immutable types such as String, Object are @E2Immutable</a:t>
-            </a:r>
-          </a:p>
-          <a:p>
-            <a:r>
-              <a:rPr lang="en-BE" dirty="0"/>
-              <a:t>Any type that can be replaced by an unbound parameter type in a class, is @E2Immutable in that class (no method call or field access)</a:t>
-            </a:r>
-          </a:p>
-          <a:p>
-            <a:r>
-              <a:rPr lang="en-BE" dirty="0"/>
-              <a:t>So records whose fields are of the above type are @E2Immutable</a:t>
-            </a:r>
-          </a:p>
-          <a:p>
-            <a:r>
-              <a:rPr lang="en-BE" dirty="0"/>
-              <a:t>Collections have “unmodifiable” variants which are @E2Immutable</a:t>
-            </a:r>
-          </a:p>
-          <a:p>
-            <a:r>
-              <a:rPr lang="en-BE" dirty="0"/>
-              <a:t>Random is NOT: each time you access a new random number, its “state” changes</a:t>
+              <a:t>Primitives and deeply immutable types such as String, Object </a:t>
+            </a:r>
+            <a:r>
+              <a:rPr lang="en-BE"/>
+              <a:t>are @Immutable</a:t>
+            </a:r>
+            <a:endParaRPr lang="en-BE" dirty="0"/>
+          </a:p>
+          <a:p>
+            <a:r>
+              <a:rPr lang="en-BE" dirty="0"/>
+              <a:t>Any type that can be replaced by an unbound parameter type in a class, </a:t>
+            </a:r>
+            <a:r>
+              <a:rPr lang="en-BE"/>
+              <a:t>is @Immutable </a:t>
+            </a:r>
+            <a:r>
+              <a:rPr lang="en-BE" dirty="0"/>
+              <a:t>in that class (no method call or field access)</a:t>
+            </a:r>
+          </a:p>
+          <a:p>
+            <a:r>
+              <a:rPr lang="en-BE" dirty="0"/>
+              <a:t>So records whose fields are of the above type </a:t>
+            </a:r>
+            <a:r>
+              <a:rPr lang="en-BE"/>
+              <a:t>are @Immutable</a:t>
+            </a:r>
+            <a:endParaRPr lang="en-BE" dirty="0"/>
+          </a:p>
+          <a:p>
+            <a:r>
+              <a:rPr lang="en-BE" dirty="0"/>
+              <a:t>Collections have “unmodifiable” variants which </a:t>
+            </a:r>
+            <a:r>
+              <a:rPr lang="en-BE"/>
+              <a:t>are @Immutable</a:t>
+            </a:r>
+            <a:endParaRPr lang="en-BE" dirty="0"/>
+          </a:p>
+          <a:p>
+            <a:r>
+              <a:rPr lang="en-US" dirty="0" err="1"/>
+              <a:t>Java.util</a:t>
+            </a:r>
+            <a:r>
+              <a:rPr lang="en-US" dirty="0"/>
+              <a:t>.</a:t>
+            </a:r>
+            <a:r>
+              <a:rPr lang="en-BE"/>
+              <a:t>Random </a:t>
+            </a:r>
+            <a:r>
+              <a:rPr lang="en-BE" dirty="0"/>
+              <a:t>is NOT: each time you access a new random number, its “state” changes</a:t>
             </a:r>
           </a:p>
         </p:txBody>
@@ -4748,8 +4886,17 @@
             <a:pPr lvl="1"/>
             <a:r>
               <a:rPr lang="en-BE" dirty="0"/>
-              <a:t>Stream.Builder -&gt; Stream</a:t>
-            </a:r>
+              <a:t>Stream.Builder </a:t>
+            </a:r>
+            <a:r>
+              <a:rPr lang="en-BE"/>
+              <a:t>-&gt; Stream</a:t>
+            </a:r>
+            <a:r>
+              <a:rPr lang="en-US" dirty="0"/>
+              <a:t> (but Stream is not immutable, as it has modifying terminal methods)</a:t>
+            </a:r>
+            <a:endParaRPr lang="en-BE" dirty="0"/>
           </a:p>
         </p:txBody>
       </p:sp>
@@ -4845,7 +4992,23 @@
           <a:p>
             <a:r>
               <a:rPr lang="en-BE" dirty="0"/>
-              <a:t>Eventual immutability (@E1Immutable, @E2Immutable) is characterised by one or more irreversible transitions from modifiable to immutable</a:t>
+              <a:t>Eventual </a:t>
+            </a:r>
+            <a:r>
+              <a:rPr lang="en-BE"/>
+              <a:t>immutability (@</a:t>
+            </a:r>
+            <a:r>
+              <a:rPr lang="en-US" dirty="0"/>
+              <a:t>FinalFields</a:t>
+            </a:r>
+            <a:r>
+              <a:rPr lang="en-BE"/>
+              <a:t>, @Immutable</a:t>
+            </a:r>
+            <a:r>
+              <a:rPr lang="en-BE" dirty="0"/>
+              <a:t>) is characterised by one or more irreversible transitions from modifiable to immutable</a:t>
             </a:r>
           </a:p>
           <a:p>
@@ -5672,8 +5835,17 @@
           <a:p>
             <a:r>
               <a:rPr lang="en-BE" dirty="0"/>
-              <a:t>© Bart Naudts, 2020-2021</a:t>
-            </a:r>
+              <a:t>© Bart Naudts</a:t>
+            </a:r>
+            <a:r>
+              <a:rPr lang="en-BE"/>
+              <a:t>, 2020-202</a:t>
+            </a:r>
+            <a:r>
+              <a:rPr lang="en-US"/>
+              <a:t>3</a:t>
+            </a:r>
+            <a:endParaRPr lang="en-BE" dirty="0"/>
           </a:p>
           <a:p>
             <a:r>
@@ -5995,7 +6167,15 @@
           <a:p>
             <a:r>
               <a:rPr lang="en-BE" dirty="0"/>
-              <a:t>Warns about bad practices (“bad” according to the someone!)</a:t>
+              <a:t>Warns about bad practices (“bad” according </a:t>
+            </a:r>
+            <a:r>
+              <a:rPr lang="en-BE"/>
+              <a:t>to someone</a:t>
+            </a:r>
+            <a:r>
+              <a:rPr lang="en-BE" dirty="0"/>
+              <a:t>!)</a:t>
             </a:r>
           </a:p>
           <a:p>

</xml_diff>